<commit_message>
Edit logbook + gegevens GMail + presentatie sprint 1
</commit_message>
<xml_diff>
--- a/Analyse/Presentatie/Sprint1.pptx
+++ b/Analyse/Presentatie/Sprint1.pptx
@@ -2190,13 +2190,7 @@
             <a:rPr lang="nl-NL" sz="1800" dirty="0" smtClean="0">
               <a:latin typeface="+mj-lt"/>
             </a:rPr>
-            <a:t>Interval = 5 </a:t>
-          </a:r>
-          <a:r>
-            <a:rPr lang="nl-NL" sz="1800" dirty="0" smtClean="0">
-              <a:latin typeface="+mj-lt"/>
-            </a:rPr>
-            <a:t>min</a:t>
+            <a:t>Interval = 5 min</a:t>
           </a:r>
           <a:endParaRPr lang="nl-NL" sz="1800" dirty="0">
             <a:latin typeface="+mj-lt"/>
@@ -2836,13 +2830,7 @@
             <a:rPr lang="nl-NL" sz="1600" dirty="0" smtClean="0">
               <a:latin typeface="+mj-lt"/>
             </a:rPr>
-            <a:t>Geeft data </a:t>
-          </a:r>
-          <a:r>
-            <a:rPr lang="nl-NL" sz="1600" dirty="0" smtClean="0">
-              <a:latin typeface="+mj-lt"/>
-            </a:rPr>
-            <a:t>door richting databank</a:t>
+            <a:t>Geeft data door richting databank</a:t>
           </a:r>
           <a:endParaRPr lang="nl-NL" sz="1600" dirty="0">
             <a:latin typeface="+mj-lt"/>
@@ -4691,13 +4679,7 @@
             <a:rPr lang="nl-NL" sz="1800" kern="1200" dirty="0" smtClean="0">
               <a:latin typeface="+mj-lt"/>
             </a:rPr>
-            <a:t>Interval = 5 </a:t>
-          </a:r>
-          <a:r>
-            <a:rPr lang="nl-NL" sz="1800" kern="1200" dirty="0" smtClean="0">
-              <a:latin typeface="+mj-lt"/>
-            </a:rPr>
-            <a:t>min</a:t>
+            <a:t>Interval = 5 min</a:t>
           </a:r>
           <a:endParaRPr lang="nl-NL" sz="1800" kern="1200" dirty="0">
             <a:latin typeface="+mj-lt"/>
@@ -5214,13 +5196,7 @@
             <a:rPr lang="nl-NL" sz="1600" kern="1200" dirty="0" smtClean="0">
               <a:latin typeface="+mj-lt"/>
             </a:rPr>
-            <a:t>Geeft data </a:t>
-          </a:r>
-          <a:r>
-            <a:rPr lang="nl-NL" sz="1600" kern="1200" dirty="0" smtClean="0">
-              <a:latin typeface="+mj-lt"/>
-            </a:rPr>
-            <a:t>door richting databank</a:t>
+            <a:t>Geeft data door richting databank</a:t>
           </a:r>
           <a:endParaRPr lang="nl-NL" sz="1600" kern="1200" dirty="0">
             <a:latin typeface="+mj-lt"/>
@@ -10234,7 +10210,7 @@
           <a:p>
             <a:fld id="{57172956-6238-400D-9974-2016EE53E7AD}" type="datetimeFigureOut">
               <a:rPr lang="en-US" smtClean="0"/>
-              <a:t>3/7/2016</a:t>
+              <a:t>3/8/2016</a:t>
             </a:fld>
             <a:endParaRPr lang="en-US"/>
           </a:p>
@@ -11160,7 +11136,7 @@
           <a:p>
             <a:fld id="{7216033D-A50F-441E-B6E8-E8749D75AA34}" type="datetime1">
               <a:rPr lang="en-US" smtClean="0"/>
-              <a:t>3/7/2016</a:t>
+              <a:t>3/8/2016</a:t>
             </a:fld>
             <a:endParaRPr lang="en-US"/>
           </a:p>
@@ -11350,7 +11326,7 @@
           <a:p>
             <a:fld id="{5A718131-A238-4DF4-8946-89510EBFF6EE}" type="datetime1">
               <a:rPr lang="en-US" smtClean="0"/>
-              <a:t>3/7/2016</a:t>
+              <a:t>3/8/2016</a:t>
             </a:fld>
             <a:endParaRPr lang="en-US"/>
           </a:p>
@@ -11532,7 +11508,7 @@
           <a:p>
             <a:fld id="{408C53EC-3ADA-46A3-84A1-A6E696808619}" type="datetime1">
               <a:rPr lang="en-US" smtClean="0"/>
-              <a:t>3/7/2016</a:t>
+              <a:t>3/8/2016</a:t>
             </a:fld>
             <a:endParaRPr lang="en-US"/>
           </a:p>
@@ -11730,7 +11706,7 @@
           <a:p>
             <a:fld id="{155AD3F8-0CB2-4424-900C-3A9938219B82}" type="datetime1">
               <a:rPr lang="en-US" smtClean="0"/>
-              <a:t>3/7/2016</a:t>
+              <a:t>3/8/2016</a:t>
             </a:fld>
             <a:endParaRPr lang="en-US"/>
           </a:p>
@@ -12013,7 +11989,7 @@
           <a:p>
             <a:fld id="{55CD22CD-2874-4B82-88B6-9E6CE5B09A90}" type="datetime1">
               <a:rPr lang="en-US" smtClean="0"/>
-              <a:t>3/7/2016</a:t>
+              <a:t>3/8/2016</a:t>
             </a:fld>
             <a:endParaRPr lang="en-US"/>
           </a:p>
@@ -12279,7 +12255,7 @@
           <a:p>
             <a:fld id="{C2EBF0EE-308B-4261-8306-2186CC58AD56}" type="datetime1">
               <a:rPr lang="en-US" smtClean="0"/>
-              <a:t>3/7/2016</a:t>
+              <a:t>3/8/2016</a:t>
             </a:fld>
             <a:endParaRPr lang="en-US"/>
           </a:p>
@@ -12694,7 +12670,7 @@
           <a:p>
             <a:fld id="{5E56E209-1B83-4994-B637-085281926E54}" type="datetime1">
               <a:rPr lang="en-US" smtClean="0"/>
-              <a:t>3/7/2016</a:t>
+              <a:t>3/8/2016</a:t>
             </a:fld>
             <a:endParaRPr lang="en-US"/>
           </a:p>
@@ -12832,7 +12808,7 @@
           <a:p>
             <a:fld id="{F541C875-329B-4A70-8668-B6469EBE2DD5}" type="datetime1">
               <a:rPr lang="en-US" smtClean="0"/>
-              <a:t>3/7/2016</a:t>
+              <a:t>3/8/2016</a:t>
             </a:fld>
             <a:endParaRPr lang="en-US"/>
           </a:p>
@@ -12939,7 +12915,7 @@
           <a:p>
             <a:fld id="{EBAB312E-881B-4ECD-8FB7-2C1BFD20B6EB}" type="datetime1">
               <a:rPr lang="en-US" smtClean="0"/>
-              <a:t>3/7/2016</a:t>
+              <a:t>3/8/2016</a:t>
             </a:fld>
             <a:endParaRPr lang="en-US"/>
           </a:p>
@@ -13191,7 +13167,7 @@
           <a:p>
             <a:fld id="{7DFECBBB-CCAA-4C33-BD88-5804D3D60320}" type="datetime1">
               <a:rPr lang="en-US" smtClean="0"/>
-              <a:t>3/7/2016</a:t>
+              <a:t>3/8/2016</a:t>
             </a:fld>
             <a:endParaRPr lang="en-US"/>
           </a:p>
@@ -13442,7 +13418,7 @@
           <a:p>
             <a:fld id="{510A15E1-5C83-4B96-B803-688E2B3FA7CC}" type="datetime1">
               <a:rPr lang="en-US" smtClean="0"/>
-              <a:t>3/7/2016</a:t>
+              <a:t>3/8/2016</a:t>
             </a:fld>
             <a:endParaRPr lang="en-US"/>
           </a:p>
@@ -14273,7 +14249,7 @@
           <a:p>
             <a:fld id="{FFAA0A22-F2FE-4DAE-AFFF-153695AE9C8C}" type="datetime1">
               <a:rPr lang="en-US" smtClean="0"/>
-              <a:t>3/7/2016</a:t>
+              <a:t>3/8/2016</a:t>
             </a:fld>
             <a:endParaRPr lang="en-US"/>
           </a:p>
@@ -18714,8 +18690,12 @@
           <a:p>
             <a:pPr lvl="1"/>
             <a:r>
+              <a:rPr lang="nl-NL" sz="1400" smtClean="0"/>
+              <a:t>2X2-matrix </a:t>
+            </a:r>
+            <a:r>
               <a:rPr lang="nl-NL" sz="1400" dirty="0" smtClean="0"/>
-              <a:t>2X2-matrix zijn = 4 aanvragen</a:t>
+              <a:t>= 4 aanvragen</a:t>
             </a:r>
           </a:p>
           <a:p>
@@ -18798,11 +18778,7 @@
             <a:pPr lvl="1"/>
             <a:r>
               <a:rPr lang="nl-NL" sz="1400" dirty="0" smtClean="0"/>
-              <a:t>100 000 </a:t>
-            </a:r>
-            <a:r>
-              <a:rPr lang="nl-NL" sz="1400" dirty="0" smtClean="0"/>
-              <a:t>aanvragen/dag</a:t>
+              <a:t>100 000 aanvragen/dag</a:t>
             </a:r>
           </a:p>
           <a:p>

</xml_diff>